<commit_message>
Few modifications to the Memory Management lecture pptx
</commit_message>
<xml_diff>
--- a/Lesson.08 - Memory Management/Memory Management.pptx
+++ b/Lesson.08 - Memory Management/Memory Management.pptx
@@ -5,10 +5,10 @@
     <p:sldMasterId id="2147483648" r:id="rId1"/>
   </p:sldMasterIdLst>
   <p:notesMasterIdLst>
-    <p:notesMasterId r:id="rId14"/>
+    <p:notesMasterId r:id="rId15"/>
   </p:notesMasterIdLst>
   <p:handoutMasterIdLst>
-    <p:handoutMasterId r:id="rId15"/>
+    <p:handoutMasterId r:id="rId16"/>
   </p:handoutMasterIdLst>
   <p:sldIdLst>
     <p:sldId id="256" r:id="rId2"/>
@@ -23,6 +23,7 @@
     <p:sldId id="294" r:id="rId11"/>
     <p:sldId id="298" r:id="rId12"/>
     <p:sldId id="295" r:id="rId13"/>
+    <p:sldId id="299" r:id="rId14"/>
   </p:sldIdLst>
   <p:sldSz cx="12192000" cy="6858000"/>
   <p:notesSz cx="6858000" cy="9144000"/>
@@ -243,7 +244,7 @@
           <a:p>
             <a:fld id="{14042657-6240-B14B-9F48-F865CB79AC7C}" type="datetimeFigureOut">
               <a:rPr lang="en-US" smtClean="0"/>
-              <a:t>11/27/25</a:t>
+              <a:t>12/2/25</a:t>
             </a:fld>
             <a:endParaRPr lang="en-US"/>
           </a:p>
@@ -427,7 +428,7 @@
           <a:p>
             <a:fld id="{5E6B121A-761B-2742-9D61-65348EACD743}" type="datetimeFigureOut">
               <a:rPr lang="en-US" smtClean="0"/>
-              <a:t>11/27/25</a:t>
+              <a:t>12/2/25</a:t>
             </a:fld>
             <a:endParaRPr lang="en-US"/>
           </a:p>
@@ -1129,7 +1130,7 @@
           <a:lstStyle/>
           <a:p>
             <a:fld id="{27C3115C-B08C-0D43-88EB-796E5A2CF561}" type="datetime1">
-              <a:t>11/27/25</a:t>
+              <a:t>12/2/25</a:t>
             </a:fld>
             <a:endParaRPr lang="en-US"/>
           </a:p>
@@ -1329,7 +1330,7 @@
           <a:lstStyle/>
           <a:p>
             <a:fld id="{D214551C-409D-5D43-A4B5-B990603BCDF0}" type="datetime1">
-              <a:t>11/27/25</a:t>
+              <a:t>12/2/25</a:t>
             </a:fld>
             <a:endParaRPr lang="en-US"/>
           </a:p>
@@ -1539,7 +1540,7 @@
           <a:lstStyle/>
           <a:p>
             <a:fld id="{664D2029-699B-0244-824D-E1509FDD8D27}" type="datetime1">
-              <a:t>11/27/25</a:t>
+              <a:t>12/2/25</a:t>
             </a:fld>
             <a:endParaRPr lang="en-US"/>
           </a:p>
@@ -1739,7 +1740,7 @@
           <a:lstStyle/>
           <a:p>
             <a:fld id="{E5C73B92-47DB-AF49-B437-412CD3FED8F2}" type="datetime1">
-              <a:t>11/27/25</a:t>
+              <a:t>12/2/25</a:t>
             </a:fld>
             <a:endParaRPr lang="en-US"/>
           </a:p>
@@ -2016,7 +2017,7 @@
           <a:lstStyle/>
           <a:p>
             <a:fld id="{7DDC87CA-9F5F-D149-95C3-6D384108962A}" type="datetime1">
-              <a:t>11/27/25</a:t>
+              <a:t>12/2/25</a:t>
             </a:fld>
             <a:endParaRPr lang="en-US"/>
           </a:p>
@@ -2283,7 +2284,7 @@
           <a:lstStyle/>
           <a:p>
             <a:fld id="{6BAD569D-5E8A-BD4F-8402-D148010AB9D7}" type="datetime1">
-              <a:t>11/27/25</a:t>
+              <a:t>12/2/25</a:t>
             </a:fld>
             <a:endParaRPr lang="en-US"/>
           </a:p>
@@ -2697,7 +2698,7 @@
           <a:lstStyle/>
           <a:p>
             <a:fld id="{719A2AF8-DCC9-4F45-8230-F414CFF5C64F}" type="datetime1">
-              <a:t>11/27/25</a:t>
+              <a:t>12/2/25</a:t>
             </a:fld>
             <a:endParaRPr lang="en-US"/>
           </a:p>
@@ -2840,7 +2841,7 @@
           <a:lstStyle/>
           <a:p>
             <a:fld id="{953291B0-BDF4-8241-9918-983E07689EDF}" type="datetime1">
-              <a:t>11/27/25</a:t>
+              <a:t>12/2/25</a:t>
             </a:fld>
             <a:endParaRPr lang="en-US"/>
           </a:p>
@@ -2955,7 +2956,7 @@
           <a:lstStyle/>
           <a:p>
             <a:fld id="{AA9BC6A5-55D4-7347-923C-EBE967A4F662}" type="datetime1">
-              <a:t>11/27/25</a:t>
+              <a:t>12/2/25</a:t>
             </a:fld>
             <a:endParaRPr lang="en-US"/>
           </a:p>
@@ -3268,7 +3269,7 @@
           <a:lstStyle/>
           <a:p>
             <a:fld id="{FF6AE172-26A6-3044-ADD3-335174251367}" type="datetime1">
-              <a:t>11/27/25</a:t>
+              <a:t>12/2/25</a:t>
             </a:fld>
             <a:endParaRPr lang="en-US"/>
           </a:p>
@@ -3558,7 +3559,7 @@
           <a:lstStyle/>
           <a:p>
             <a:fld id="{6944F477-34E9-0440-B989-E35432EEC7D5}" type="datetime1">
-              <a:t>11/27/25</a:t>
+              <a:t>12/2/25</a:t>
             </a:fld>
             <a:endParaRPr lang="en-US"/>
           </a:p>
@@ -3801,7 +3802,7 @@
           </a:lstStyle>
           <a:p>
             <a:fld id="{80D78AEA-AFE4-0E4C-AD2F-C54BAF6A75D1}" type="datetime1">
-              <a:t>11/27/25</a:t>
+              <a:t>12/2/25</a:t>
             </a:fld>
             <a:endParaRPr lang="en-US"/>
           </a:p>
@@ -6630,6 +6631,275 @@
       <p:bldP spid="34" grpId="0"/>
     </p:bldLst>
   </p:timing>
+</p:sld>
+</file>
+
+<file path=ppt/slides/slide13.xml><?xml version="1.0" encoding="utf-8"?>
+<p:sld xmlns:a="http://schemas.openxmlformats.org/drawingml/2006/main" xmlns:r="http://schemas.openxmlformats.org/officeDocument/2006/relationships" xmlns:p="http://schemas.openxmlformats.org/presentationml/2006/main">
+  <p:cSld>
+    <p:spTree>
+      <p:nvGrpSpPr>
+        <p:cNvPr id="1" name="">
+          <a:extLst>
+            <a:ext uri="{FF2B5EF4-FFF2-40B4-BE49-F238E27FC236}">
+              <a16:creationId xmlns:a16="http://schemas.microsoft.com/office/drawing/2014/main" id="{3BF04C75-62DD-1462-1900-E86C112F637B}"/>
+            </a:ext>
+          </a:extLst>
+        </p:cNvPr>
+        <p:cNvGrpSpPr/>
+        <p:nvPr/>
+      </p:nvGrpSpPr>
+      <p:grpSpPr>
+        <a:xfrm>
+          <a:off x="0" y="0"/>
+          <a:ext cx="0" cy="0"/>
+          <a:chOff x="0" y="0"/>
+          <a:chExt cx="0" cy="0"/>
+        </a:xfrm>
+      </p:grpSpPr>
+      <p:sp>
+        <p:nvSpPr>
+          <p:cNvPr id="3" name="Footer Placeholder 2">
+            <a:extLst>
+              <a:ext uri="{FF2B5EF4-FFF2-40B4-BE49-F238E27FC236}">
+                <a16:creationId xmlns:a16="http://schemas.microsoft.com/office/drawing/2014/main" id="{DC0EAA1D-C56F-7944-8E97-0B0FA6CD25C5}"/>
+              </a:ext>
+            </a:extLst>
+          </p:cNvPr>
+          <p:cNvSpPr>
+            <a:spLocks noGrp="1"/>
+          </p:cNvSpPr>
+          <p:nvPr>
+            <p:ph type="ftr" sz="quarter" idx="11"/>
+          </p:nvPr>
+        </p:nvSpPr>
+        <p:spPr/>
+        <p:txBody>
+          <a:bodyPr/>
+          <a:lstStyle/>
+          <a:p>
+            <a:r>
+              <a:rPr lang="en-US"/>
+              <a:t>ASE - Memory Management</a:t>
+            </a:r>
+          </a:p>
+        </p:txBody>
+      </p:sp>
+      <p:sp>
+        <p:nvSpPr>
+          <p:cNvPr id="6" name="Slide Number Placeholder 5">
+            <a:extLst>
+              <a:ext uri="{FF2B5EF4-FFF2-40B4-BE49-F238E27FC236}">
+                <a16:creationId xmlns:a16="http://schemas.microsoft.com/office/drawing/2014/main" id="{916524A5-EDD0-CE54-4262-BD8BE8DE17FA}"/>
+              </a:ext>
+            </a:extLst>
+          </p:cNvPr>
+          <p:cNvSpPr>
+            <a:spLocks noGrp="1"/>
+          </p:cNvSpPr>
+          <p:nvPr>
+            <p:ph type="sldNum" sz="quarter" idx="12"/>
+          </p:nvPr>
+        </p:nvSpPr>
+        <p:spPr/>
+        <p:txBody>
+          <a:bodyPr/>
+          <a:lstStyle/>
+          <a:p>
+            <a:fld id="{23D81C8F-CB39-4E4D-98E4-8C3FEDF75126}" type="slidenum">
+              <a:rPr lang="en-US" smtClean="0"/>
+              <a:t>13</a:t>
+            </a:fld>
+            <a:endParaRPr lang="en-US"/>
+          </a:p>
+        </p:txBody>
+      </p:sp>
+      <p:sp>
+        <p:nvSpPr>
+          <p:cNvPr id="7" name="TextBox 6">
+            <a:extLst>
+              <a:ext uri="{FF2B5EF4-FFF2-40B4-BE49-F238E27FC236}">
+                <a16:creationId xmlns:a16="http://schemas.microsoft.com/office/drawing/2014/main" id="{70300299-30B6-961D-9CD9-8DEA6B1D5146}"/>
+              </a:ext>
+            </a:extLst>
+          </p:cNvPr>
+          <p:cNvSpPr txBox="1"/>
+          <p:nvPr/>
+        </p:nvSpPr>
+        <p:spPr>
+          <a:xfrm>
+            <a:off x="535709" y="194055"/>
+            <a:ext cx="1637821" cy="369332"/>
+          </a:xfrm>
+          <a:prstGeom prst="rect">
+            <a:avLst/>
+          </a:prstGeom>
+          <a:noFill/>
+        </p:spPr>
+        <p:txBody>
+          <a:bodyPr wrap="none" rtlCol="0">
+            <a:spAutoFit/>
+          </a:bodyPr>
+          <a:lstStyle/>
+          <a:p>
+            <a:r>
+              <a:rPr lang="en-US" dirty="0"/>
+              <a:t>Key takeaways</a:t>
+            </a:r>
+          </a:p>
+        </p:txBody>
+      </p:sp>
+      <p:sp>
+        <p:nvSpPr>
+          <p:cNvPr id="4" name="TextBox 3">
+            <a:extLst>
+              <a:ext uri="{FF2B5EF4-FFF2-40B4-BE49-F238E27FC236}">
+                <a16:creationId xmlns:a16="http://schemas.microsoft.com/office/drawing/2014/main" id="{2BB297E5-0132-61A9-888E-8640BADCDB01}"/>
+              </a:ext>
+            </a:extLst>
+          </p:cNvPr>
+          <p:cNvSpPr txBox="1"/>
+          <p:nvPr/>
+        </p:nvSpPr>
+        <p:spPr>
+          <a:xfrm>
+            <a:off x="641023" y="1197204"/>
+            <a:ext cx="7694671" cy="3693319"/>
+          </a:xfrm>
+          <a:prstGeom prst="rect">
+            <a:avLst/>
+          </a:prstGeom>
+          <a:noFill/>
+        </p:spPr>
+        <p:txBody>
+          <a:bodyPr wrap="none" rtlCol="0">
+            <a:spAutoFit/>
+          </a:bodyPr>
+          <a:lstStyle/>
+          <a:p>
+            <a:pPr marL="285750" indent="-285750">
+              <a:buFont typeface="Arial" panose="020B0604020202020204" pitchFamily="34" charset="0"/>
+              <a:buChar char="•"/>
+            </a:pPr>
+            <a:r>
+              <a:rPr lang="en-US"/>
+              <a:t>Reduce the scope of the variables</a:t>
+            </a:r>
+          </a:p>
+          <a:p>
+            <a:pPr marL="285750" indent="-285750">
+              <a:buFont typeface="Arial" panose="020B0604020202020204" pitchFamily="34" charset="0"/>
+              <a:buChar char="•"/>
+            </a:pPr>
+            <a:endParaRPr lang="en-US"/>
+          </a:p>
+          <a:p>
+            <a:pPr marL="285750" indent="-285750">
+              <a:buFont typeface="Arial" panose="020B0604020202020204" pitchFamily="34" charset="0"/>
+              <a:buChar char="•"/>
+            </a:pPr>
+            <a:endParaRPr lang="en-US"/>
+          </a:p>
+          <a:p>
+            <a:pPr marL="285750" indent="-285750">
+              <a:buFont typeface="Arial" panose="020B0604020202020204" pitchFamily="34" charset="0"/>
+              <a:buChar char="•"/>
+            </a:pPr>
+            <a:r>
+              <a:rPr lang="en-US"/>
+              <a:t>Make clear who owns what and enforce it, ownership must be explicit</a:t>
+            </a:r>
+          </a:p>
+          <a:p>
+            <a:pPr marL="285750" indent="-285750">
+              <a:buFont typeface="Arial" panose="020B0604020202020204" pitchFamily="34" charset="0"/>
+              <a:buChar char="•"/>
+            </a:pPr>
+            <a:endParaRPr lang="en-US"/>
+          </a:p>
+          <a:p>
+            <a:pPr marL="285750" indent="-285750">
+              <a:buFont typeface="Arial" panose="020B0604020202020204" pitchFamily="34" charset="0"/>
+              <a:buChar char="•"/>
+            </a:pPr>
+            <a:endParaRPr lang="en-US"/>
+          </a:p>
+          <a:p>
+            <a:pPr marL="285750" indent="-285750">
+              <a:buFont typeface="Arial" panose="020B0604020202020204" pitchFamily="34" charset="0"/>
+              <a:buChar char="•"/>
+            </a:pPr>
+            <a:r>
+              <a:rPr lang="en-US"/>
+              <a:t>Collection lifecycle: remove the items from a collection when not needed</a:t>
+            </a:r>
+          </a:p>
+          <a:p>
+            <a:pPr marL="285750" indent="-285750">
+              <a:buFont typeface="Arial" panose="020B0604020202020204" pitchFamily="34" charset="0"/>
+              <a:buChar char="•"/>
+            </a:pPr>
+            <a:endParaRPr lang="en-US"/>
+          </a:p>
+          <a:p>
+            <a:pPr marL="285750" indent="-285750">
+              <a:buFont typeface="Arial" panose="020B0604020202020204" pitchFamily="34" charset="0"/>
+              <a:buChar char="•"/>
+            </a:pPr>
+            <a:endParaRPr lang="en-US"/>
+          </a:p>
+          <a:p>
+            <a:pPr marL="285750" indent="-285750">
+              <a:buFont typeface="Arial" panose="020B0604020202020204" pitchFamily="34" charset="0"/>
+              <a:buChar char="•"/>
+            </a:pPr>
+            <a:r>
+              <a:rPr lang="en-US"/>
+              <a:t>Use a profiler if available</a:t>
+            </a:r>
+          </a:p>
+          <a:p>
+            <a:pPr marL="742950" lvl="1" indent="-285750">
+              <a:buFont typeface="Arial" panose="020B0604020202020204" pitchFamily="34" charset="0"/>
+              <a:buChar char="•"/>
+            </a:pPr>
+            <a:r>
+              <a:rPr lang="en-US"/>
+              <a:t>Java: VisualVM</a:t>
+            </a:r>
+          </a:p>
+          <a:p>
+            <a:pPr marL="742950" lvl="1" indent="-285750">
+              <a:buFont typeface="Arial" panose="020B0604020202020204" pitchFamily="34" charset="0"/>
+              <a:buChar char="•"/>
+            </a:pPr>
+            <a:r>
+              <a:rPr lang="en-US"/>
+              <a:t>Node.JS: pass “--prof” to the node process</a:t>
+            </a:r>
+          </a:p>
+          <a:p>
+            <a:pPr marL="742950" lvl="1" indent="-285750">
+              <a:buFont typeface="Arial" panose="020B0604020202020204" pitchFamily="34" charset="0"/>
+              <a:buChar char="•"/>
+            </a:pPr>
+            <a:r>
+              <a:rPr lang="en-US"/>
+              <a:t>Python: profile/cProfile library</a:t>
+            </a:r>
+          </a:p>
+        </p:txBody>
+      </p:sp>
+    </p:spTree>
+    <p:extLst>
+      <p:ext uri="{BB962C8B-B14F-4D97-AF65-F5344CB8AC3E}">
+        <p14:creationId xmlns:p14="http://schemas.microsoft.com/office/powerpoint/2010/main" val="2476463377"/>
+      </p:ext>
+    </p:extLst>
+  </p:cSld>
+  <p:clrMapOvr>
+    <a:masterClrMapping/>
+  </p:clrMapOvr>
 </p:sld>
 </file>
 
@@ -11571,7 +11841,7 @@
           <a:p>
             <a:r>
               <a:rPr lang="en-US"/>
-              <a:t>Some languages offer a RAII-like approach, like Java, Python &amp; Typescript (in the near future)</a:t>
+              <a:t>Some languages offer a RAII-like approach, like Java, Python &amp; Javascript (most recent ES)</a:t>
             </a:r>
           </a:p>
         </p:txBody>
@@ -11590,13 +11860,18 @@
         </p:nvSpPr>
         <p:spPr>
           <a:xfrm>
-            <a:off x="795646" y="1482495"/>
+            <a:off x="535709" y="1470130"/>
             <a:ext cx="5856090" cy="4708981"/>
           </a:xfrm>
           <a:prstGeom prst="rect">
             <a:avLst/>
           </a:prstGeom>
-          <a:noFill/>
+          <a:solidFill>
+            <a:schemeClr val="tx2">
+              <a:lumMod val="10000"/>
+              <a:lumOff val="90000"/>
+            </a:schemeClr>
+          </a:solidFill>
         </p:spPr>
         <p:txBody>
           <a:bodyPr wrap="none" rtlCol="0">
@@ -11609,7 +11884,24 @@
                 <a:latin typeface="Courier New" panose="02070309020205020404" pitchFamily="49" charset="0"/>
                 <a:cs typeface="Courier New" panose="02070309020205020404" pitchFamily="49" charset="0"/>
               </a:rPr>
-              <a:t>public class DatabaseConnection implements AutoCloseable {</a:t>
+              <a:t>public class DatabaseConnection </a:t>
+            </a:r>
+            <a:r>
+              <a:rPr lang="en-US" sz="1200" b="1">
+                <a:solidFill>
+                  <a:srgbClr val="FF0000"/>
+                </a:solidFill>
+                <a:latin typeface="Courier New" panose="02070309020205020404" pitchFamily="49" charset="0"/>
+                <a:cs typeface="Courier New" panose="02070309020205020404" pitchFamily="49" charset="0"/>
+              </a:rPr>
+              <a:t>implements AutoCloseable </a:t>
+            </a:r>
+            <a:r>
+              <a:rPr lang="en-US" sz="1200">
+                <a:latin typeface="Courier New" panose="02070309020205020404" pitchFamily="49" charset="0"/>
+                <a:cs typeface="Courier New" panose="02070309020205020404" pitchFamily="49" charset="0"/>
+              </a:rPr>
+              <a:t>{</a:t>
             </a:r>
           </a:p>
           <a:p>
@@ -11708,12 +12000,25 @@
                 <a:latin typeface="Courier New" panose="02070309020205020404" pitchFamily="49" charset="0"/>
                 <a:cs typeface="Courier New" panose="02070309020205020404" pitchFamily="49" charset="0"/>
               </a:rPr>
-              <a:t>  @Override</a:t>
-            </a:r>
-          </a:p>
-          <a:p>
-            <a:r>
-              <a:rPr lang="en-US" sz="1200">
+              <a:t>  </a:t>
+            </a:r>
+            <a:r>
+              <a:rPr lang="en-US" sz="1200" b="1">
+                <a:solidFill>
+                  <a:srgbClr val="FF0000"/>
+                </a:solidFill>
+                <a:latin typeface="Courier New" panose="02070309020205020404" pitchFamily="49" charset="0"/>
+                <a:cs typeface="Courier New" panose="02070309020205020404" pitchFamily="49" charset="0"/>
+              </a:rPr>
+              <a:t>@Override</a:t>
+            </a:r>
+          </a:p>
+          <a:p>
+            <a:r>
+              <a:rPr lang="en-US" sz="1200" b="1">
+                <a:solidFill>
+                  <a:srgbClr val="FF0000"/>
+                </a:solidFill>
                 <a:latin typeface="Courier New" panose="02070309020205020404" pitchFamily="49" charset="0"/>
                 <a:cs typeface="Courier New" panose="02070309020205020404" pitchFamily="49" charset="0"/>
               </a:rPr>
@@ -11835,13 +12140,18 @@
         </p:nvSpPr>
         <p:spPr>
           <a:xfrm>
-            <a:off x="5130140" y="4180115"/>
+            <a:off x="3709603" y="4603040"/>
             <a:ext cx="6506909" cy="1569660"/>
           </a:xfrm>
           <a:prstGeom prst="rect">
             <a:avLst/>
           </a:prstGeom>
-          <a:noFill/>
+          <a:solidFill>
+            <a:schemeClr val="tx2">
+              <a:lumMod val="10000"/>
+              <a:lumOff val="90000"/>
+            </a:schemeClr>
+          </a:solidFill>
         </p:spPr>
         <p:txBody>
           <a:bodyPr wrap="none" rtlCol="0">
@@ -11918,6 +12228,208 @@
                 <a:cs typeface="Courier New" panose="02070309020205020404" pitchFamily="49" charset="0"/>
               </a:rPr>
               <a:t>}</a:t>
+            </a:r>
+          </a:p>
+        </p:txBody>
+      </p:sp>
+      <p:sp>
+        <p:nvSpPr>
+          <p:cNvPr id="5" name="TextBox 4">
+            <a:extLst>
+              <a:ext uri="{FF2B5EF4-FFF2-40B4-BE49-F238E27FC236}">
+                <a16:creationId xmlns:a16="http://schemas.microsoft.com/office/drawing/2014/main" id="{2D2E5853-15AF-9921-B8C0-CA9F604915CD}"/>
+              </a:ext>
+            </a:extLst>
+          </p:cNvPr>
+          <p:cNvSpPr txBox="1"/>
+          <p:nvPr/>
+        </p:nvSpPr>
+        <p:spPr>
+          <a:xfrm>
+            <a:off x="7534315" y="1476541"/>
+            <a:ext cx="4416594" cy="2708434"/>
+          </a:xfrm>
+          <a:prstGeom prst="rect">
+            <a:avLst/>
+          </a:prstGeom>
+          <a:solidFill>
+            <a:schemeClr val="accent6">
+              <a:lumMod val="20000"/>
+              <a:lumOff val="80000"/>
+            </a:schemeClr>
+          </a:solidFill>
+        </p:spPr>
+        <p:txBody>
+          <a:bodyPr wrap="none" rtlCol="0">
+            <a:spAutoFit/>
+          </a:bodyPr>
+          <a:lstStyle/>
+          <a:p>
+            <a:r>
+              <a:rPr lang="en-US" sz="1000">
+                <a:latin typeface="Courier New" panose="02070309020205020404" pitchFamily="49" charset="0"/>
+                <a:cs typeface="Courier New" panose="02070309020205020404" pitchFamily="49" charset="0"/>
+              </a:rPr>
+              <a:t>PYTHON</a:t>
+            </a:r>
+            <a:br>
+              <a:rPr lang="en-US" sz="1000">
+                <a:latin typeface="Courier New" panose="02070309020205020404" pitchFamily="49" charset="0"/>
+                <a:cs typeface="Courier New" panose="02070309020205020404" pitchFamily="49" charset="0"/>
+              </a:rPr>
+            </a:br>
+            <a:br>
+              <a:rPr lang="en-US" sz="1000">
+                <a:latin typeface="Courier New" panose="02070309020205020404" pitchFamily="49" charset="0"/>
+                <a:cs typeface="Courier New" panose="02070309020205020404" pitchFamily="49" charset="0"/>
+              </a:rPr>
+            </a:br>
+            <a:r>
+              <a:rPr lang="en-US" sz="1000">
+                <a:latin typeface="Courier New" panose="02070309020205020404" pitchFamily="49" charset="0"/>
+                <a:cs typeface="Courier New" panose="02070309020205020404" pitchFamily="49" charset="0"/>
+              </a:rPr>
+              <a:t>class FileManager:</a:t>
+            </a:r>
+          </a:p>
+          <a:p>
+            <a:r>
+              <a:rPr lang="en-US" sz="1000">
+                <a:latin typeface="Courier New" panose="02070309020205020404" pitchFamily="49" charset="0"/>
+                <a:cs typeface="Courier New" panose="02070309020205020404" pitchFamily="49" charset="0"/>
+              </a:rPr>
+              <a:t>    def __init__(self, filename, mode):</a:t>
+            </a:r>
+          </a:p>
+          <a:p>
+            <a:r>
+              <a:rPr lang="en-US" sz="1000">
+                <a:latin typeface="Courier New" panose="02070309020205020404" pitchFamily="49" charset="0"/>
+                <a:cs typeface="Courier New" panose="02070309020205020404" pitchFamily="49" charset="0"/>
+              </a:rPr>
+              <a:t>        self.filename = filename</a:t>
+            </a:r>
+          </a:p>
+          <a:p>
+            <a:r>
+              <a:rPr lang="en-US" sz="1000">
+                <a:latin typeface="Courier New" panose="02070309020205020404" pitchFamily="49" charset="0"/>
+                <a:cs typeface="Courier New" panose="02070309020205020404" pitchFamily="49" charset="0"/>
+              </a:rPr>
+              <a:t>        self.mode = mode</a:t>
+            </a:r>
+          </a:p>
+          <a:p>
+            <a:endParaRPr lang="en-US" sz="1000">
+              <a:latin typeface="Courier New" panose="02070309020205020404" pitchFamily="49" charset="0"/>
+              <a:cs typeface="Courier New" panose="02070309020205020404" pitchFamily="49" charset="0"/>
+            </a:endParaRPr>
+          </a:p>
+          <a:p>
+            <a:r>
+              <a:rPr lang="en-US" sz="1000">
+                <a:latin typeface="Courier New" panose="02070309020205020404" pitchFamily="49" charset="0"/>
+                <a:cs typeface="Courier New" panose="02070309020205020404" pitchFamily="49" charset="0"/>
+              </a:rPr>
+              <a:t>    </a:t>
+            </a:r>
+            <a:r>
+              <a:rPr lang="en-US" sz="1000" b="1">
+                <a:solidFill>
+                  <a:srgbClr val="FF0000"/>
+                </a:solidFill>
+                <a:latin typeface="Courier New" panose="02070309020205020404" pitchFamily="49" charset="0"/>
+                <a:cs typeface="Courier New" panose="02070309020205020404" pitchFamily="49" charset="0"/>
+              </a:rPr>
+              <a:t>def __enter__(self):</a:t>
+            </a:r>
+          </a:p>
+          <a:p>
+            <a:r>
+              <a:rPr lang="en-US" sz="1000">
+                <a:latin typeface="Courier New" panose="02070309020205020404" pitchFamily="49" charset="0"/>
+                <a:cs typeface="Courier New" panose="02070309020205020404" pitchFamily="49" charset="0"/>
+              </a:rPr>
+              <a:t>        self.file = open(self.filename, self.mode)</a:t>
+            </a:r>
+          </a:p>
+          <a:p>
+            <a:r>
+              <a:rPr lang="en-US" sz="1000">
+                <a:latin typeface="Courier New" panose="02070309020205020404" pitchFamily="49" charset="0"/>
+                <a:cs typeface="Courier New" panose="02070309020205020404" pitchFamily="49" charset="0"/>
+              </a:rPr>
+              <a:t>        return self.file</a:t>
+            </a:r>
+          </a:p>
+          <a:p>
+            <a:endParaRPr lang="en-US" sz="1000">
+              <a:latin typeface="Courier New" panose="02070309020205020404" pitchFamily="49" charset="0"/>
+              <a:cs typeface="Courier New" panose="02070309020205020404" pitchFamily="49" charset="0"/>
+            </a:endParaRPr>
+          </a:p>
+          <a:p>
+            <a:r>
+              <a:rPr lang="en-US" sz="1000">
+                <a:latin typeface="Courier New" panose="02070309020205020404" pitchFamily="49" charset="0"/>
+                <a:cs typeface="Courier New" panose="02070309020205020404" pitchFamily="49" charset="0"/>
+              </a:rPr>
+              <a:t>    </a:t>
+            </a:r>
+            <a:r>
+              <a:rPr lang="en-US" sz="1000" b="1">
+                <a:solidFill>
+                  <a:srgbClr val="FF0000"/>
+                </a:solidFill>
+                <a:latin typeface="Courier New" panose="02070309020205020404" pitchFamily="49" charset="0"/>
+                <a:cs typeface="Courier New" panose="02070309020205020404" pitchFamily="49" charset="0"/>
+              </a:rPr>
+              <a:t>def __exit__(self, exc_type, exc_value, traceback):</a:t>
+            </a:r>
+          </a:p>
+          <a:p>
+            <a:r>
+              <a:rPr lang="en-US" sz="1000">
+                <a:latin typeface="Courier New" panose="02070309020205020404" pitchFamily="49" charset="0"/>
+                <a:cs typeface="Courier New" panose="02070309020205020404" pitchFamily="49" charset="0"/>
+              </a:rPr>
+              <a:t>        self.file.close()</a:t>
+            </a:r>
+          </a:p>
+          <a:p>
+            <a:endParaRPr lang="en-US" sz="1000">
+              <a:latin typeface="Courier New" panose="02070309020205020404" pitchFamily="49" charset="0"/>
+              <a:cs typeface="Courier New" panose="02070309020205020404" pitchFamily="49" charset="0"/>
+            </a:endParaRPr>
+          </a:p>
+          <a:p>
+            <a:r>
+              <a:rPr lang="en-US" sz="1000">
+                <a:latin typeface="Courier New" panose="02070309020205020404" pitchFamily="49" charset="0"/>
+                <a:cs typeface="Courier New" panose="02070309020205020404" pitchFamily="49" charset="0"/>
+              </a:rPr>
+              <a:t># using the custom context manager</a:t>
+            </a:r>
+          </a:p>
+          <a:p>
+            <a:r>
+              <a:rPr lang="en-US" sz="1000" b="1">
+                <a:solidFill>
+                  <a:srgbClr val="FF0000"/>
+                </a:solidFill>
+                <a:latin typeface="Courier New" panose="02070309020205020404" pitchFamily="49" charset="0"/>
+                <a:cs typeface="Courier New" panose="02070309020205020404" pitchFamily="49" charset="0"/>
+              </a:rPr>
+              <a:t>with FileManager('example.txt', 'w') as file:</a:t>
+            </a:r>
+          </a:p>
+          <a:p>
+            <a:r>
+              <a:rPr lang="en-US" sz="1000">
+                <a:latin typeface="Courier New" panose="02070309020205020404" pitchFamily="49" charset="0"/>
+                <a:cs typeface="Courier New" panose="02070309020205020404" pitchFamily="49" charset="0"/>
+              </a:rPr>
+              <a:t>    file.write('Hello, World!')</a:t>
             </a:r>
           </a:p>
         </p:txBody>

</xml_diff>